<commit_message>
master: rewworked tutorial instructions
</commit_message>
<xml_diff>
--- a/e-Portfolio.pptx
+++ b/e-Portfolio.pptx
@@ -188,6 +188,68 @@
 <file path=ppt/changesInfos/changesInfo1.xml><?xml version="1.0" encoding="utf-8"?>
 <pc:chgInfo xmlns:a="http://schemas.openxmlformats.org/drawingml/2006/main" xmlns:r="http://schemas.openxmlformats.org/officeDocument/2006/relationships" xmlns:ac="http://schemas.microsoft.com/office/drawing/2013/main/command" xmlns:pc="http://schemas.microsoft.com/office/powerpoint/2013/main/command">
   <pc:docChgLst>
+    <pc:chgData name="Muesseler, Raphael" userId="db0d05db-f100-49e5-bf73-888fa57587cf" providerId="ADAL" clId="{14CEDCA6-2F78-4036-810D-FB5A3A75A079}"/>
+    <pc:docChg chg="modSld">
+      <pc:chgData name="Muesseler, Raphael" userId="db0d05db-f100-49e5-bf73-888fa57587cf" providerId="ADAL" clId="{14CEDCA6-2F78-4036-810D-FB5A3A75A079}" dt="2018-12-04T08:56:03.361" v="33" actId="20577"/>
+      <pc:docMkLst>
+        <pc:docMk/>
+      </pc:docMkLst>
+      <pc:sldChg chg="modSp">
+        <pc:chgData name="Muesseler, Raphael" userId="db0d05db-f100-49e5-bf73-888fa57587cf" providerId="ADAL" clId="{14CEDCA6-2F78-4036-810D-FB5A3A75A079}" dt="2018-12-04T08:05:51.807" v="0" actId="1076"/>
+        <pc:sldMkLst>
+          <pc:docMk/>
+          <pc:sldMk cId="1881851238" sldId="413"/>
+        </pc:sldMkLst>
+        <pc:picChg chg="mod">
+          <ac:chgData name="Muesseler, Raphael" userId="db0d05db-f100-49e5-bf73-888fa57587cf" providerId="ADAL" clId="{14CEDCA6-2F78-4036-810D-FB5A3A75A079}" dt="2018-12-04T08:05:51.807" v="0" actId="1076"/>
+          <ac:picMkLst>
+            <pc:docMk/>
+            <pc:sldMk cId="1881851238" sldId="413"/>
+            <ac:picMk id="5" creationId="{FA1DDB94-4A54-40F9-AE2C-A0551F2C4104}"/>
+          </ac:picMkLst>
+        </pc:picChg>
+      </pc:sldChg>
+      <pc:sldChg chg="addSp delSp modSp modAnim">
+        <pc:chgData name="Muesseler, Raphael" userId="db0d05db-f100-49e5-bf73-888fa57587cf" providerId="ADAL" clId="{14CEDCA6-2F78-4036-810D-FB5A3A75A079}" dt="2018-12-04T08:39:28.322" v="10" actId="20577"/>
+        <pc:sldMkLst>
+          <pc:docMk/>
+          <pc:sldMk cId="2739978072" sldId="491"/>
+        </pc:sldMkLst>
+        <pc:spChg chg="add del">
+          <ac:chgData name="Muesseler, Raphael" userId="db0d05db-f100-49e5-bf73-888fa57587cf" providerId="ADAL" clId="{14CEDCA6-2F78-4036-810D-FB5A3A75A079}" dt="2018-12-04T08:38:46.460" v="4"/>
+          <ac:spMkLst>
+            <pc:docMk/>
+            <pc:sldMk cId="2739978072" sldId="491"/>
+            <ac:spMk id="2" creationId="{52AE61F2-69D2-4227-ADC1-0900CE050E3A}"/>
+          </ac:spMkLst>
+        </pc:spChg>
+        <pc:spChg chg="mod">
+          <ac:chgData name="Muesseler, Raphael" userId="db0d05db-f100-49e5-bf73-888fa57587cf" providerId="ADAL" clId="{14CEDCA6-2F78-4036-810D-FB5A3A75A079}" dt="2018-12-04T08:39:28.322" v="10" actId="20577"/>
+          <ac:spMkLst>
+            <pc:docMk/>
+            <pc:sldMk cId="2739978072" sldId="491"/>
+            <ac:spMk id="11" creationId="{00000000-0000-0000-0000-000000000000}"/>
+          </ac:spMkLst>
+        </pc:spChg>
+      </pc:sldChg>
+      <pc:sldChg chg="modSp">
+        <pc:chgData name="Muesseler, Raphael" userId="db0d05db-f100-49e5-bf73-888fa57587cf" providerId="ADAL" clId="{14CEDCA6-2F78-4036-810D-FB5A3A75A079}" dt="2018-12-04T08:56:03.361" v="33" actId="20577"/>
+        <pc:sldMkLst>
+          <pc:docMk/>
+          <pc:sldMk cId="1187313786" sldId="495"/>
+        </pc:sldMkLst>
+        <pc:spChg chg="mod">
+          <ac:chgData name="Muesseler, Raphael" userId="db0d05db-f100-49e5-bf73-888fa57587cf" providerId="ADAL" clId="{14CEDCA6-2F78-4036-810D-FB5A3A75A079}" dt="2018-12-04T08:56:03.361" v="33" actId="20577"/>
+          <ac:spMkLst>
+            <pc:docMk/>
+            <pc:sldMk cId="1187313786" sldId="495"/>
+            <ac:spMk id="11" creationId="{00000000-0000-0000-0000-000000000000}"/>
+          </ac:spMkLst>
+        </pc:spChg>
+      </pc:sldChg>
+    </pc:docChg>
+  </pc:docChgLst>
+  <pc:docChgLst>
     <pc:chgData name="Muesseler, Raphael" userId="db0d05db-f100-49e5-bf73-888fa57587cf" providerId="ADAL" clId="{C9B5ED1B-45CA-46AA-90F9-DB0D7D3490F0}"/>
     <pc:docChg chg="undo redo custSel addSld delSld modSld sldOrd">
       <pc:chgData name="Muesseler, Raphael" userId="db0d05db-f100-49e5-bf73-888fa57587cf" providerId="ADAL" clId="{C9B5ED1B-45CA-46AA-90F9-DB0D7D3490F0}" dt="2018-11-30T14:08:59.842" v="3211" actId="6549"/>
@@ -206,21 +268,6 @@
             <pc:docMk/>
             <pc:sldMk cId="0" sldId="344"/>
             <ac:spMk id="3" creationId="{00000000-0000-0000-0000-000000000000}"/>
-          </ac:spMkLst>
-        </pc:spChg>
-      </pc:sldChg>
-      <pc:sldChg chg="modSp">
-        <pc:chgData name="Muesseler, Raphael" userId="db0d05db-f100-49e5-bf73-888fa57587cf" providerId="ADAL" clId="{C9B5ED1B-45CA-46AA-90F9-DB0D7D3490F0}" dt="2018-11-28T08:03:44.712" v="635" actId="20577"/>
-        <pc:sldMkLst>
-          <pc:docMk/>
-          <pc:sldMk cId="3295641251" sldId="374"/>
-        </pc:sldMkLst>
-        <pc:spChg chg="mod">
-          <ac:chgData name="Muesseler, Raphael" userId="db0d05db-f100-49e5-bf73-888fa57587cf" providerId="ADAL" clId="{C9B5ED1B-45CA-46AA-90F9-DB0D7D3490F0}" dt="2018-11-28T08:03:44.712" v="635" actId="20577"/>
-          <ac:spMkLst>
-            <pc:docMk/>
-            <pc:sldMk cId="3295641251" sldId="374"/>
-            <ac:spMk id="11" creationId="{00000000-0000-0000-0000-000000000000}"/>
           </ac:spMkLst>
         </pc:spChg>
       </pc:sldChg>
@@ -12881,6 +12928,22 @@
               <a:rPr lang="en-US" i="1" dirty="0" err="1"/>
               <a:t>admin:repo_hook</a:t>
             </a:r>
+            <a:r>
+              <a:rPr lang="en-US" i="1" dirty="0"/>
+              <a:t>, </a:t>
+            </a:r>
+            <a:r>
+              <a:rPr lang="en-US" i="1" dirty="0" err="1"/>
+              <a:t>user:read</a:t>
+            </a:r>
+            <a:r>
+              <a:rPr lang="en-US" i="1" dirty="0"/>
+              <a:t>, </a:t>
+            </a:r>
+            <a:r>
+              <a:rPr lang="en-US" i="1" dirty="0" err="1"/>
+              <a:t>user:email</a:t>
+            </a:r>
             <a:endParaRPr lang="en-US" i="1" dirty="0"/>
           </a:p>
           <a:p>
@@ -13201,7 +13264,7 @@
         </p:blipFill>
         <p:spPr bwMode="auto">
           <a:xfrm>
-            <a:off x="504000" y="5929983"/>
+            <a:off x="504000" y="5921859"/>
             <a:ext cx="1032141" cy="430887"/>
           </a:xfrm>
           <a:prstGeom prst="rect">
@@ -17295,7 +17358,73 @@
                 <a:latin typeface="Lucida Console" panose="020B0609040504020204" pitchFamily="49" charset="0"/>
                 <a:cs typeface="Courier New" panose="02070309020205020404" pitchFamily="49" charset="0"/>
               </a:rPr>
-              <a:t> apt-key add -</a:t>
+              <a:t> apt-key add –</a:t>
+            </a:r>
+          </a:p>
+          <a:p>
+            <a:pPr marL="637164" lvl="1" indent="-457200">
+              <a:buFont typeface="Symbol" panose="05050102010706020507" pitchFamily="18" charset="2"/>
+              <a:buChar char="-"/>
+            </a:pPr>
+            <a:r>
+              <a:rPr lang="en-US" sz="1400" dirty="0" err="1">
+                <a:latin typeface="Lucida Console" panose="020B0609040504020204" pitchFamily="49" charset="0"/>
+              </a:rPr>
+              <a:t>sudo</a:t>
+            </a:r>
+            <a:r>
+              <a:rPr lang="en-US" sz="1400" dirty="0">
+                <a:latin typeface="Lucida Console" panose="020B0609040504020204" pitchFamily="49" charset="0"/>
+              </a:rPr>
+              <a:t> </a:t>
+            </a:r>
+            <a:r>
+              <a:rPr lang="en-US" sz="1400" dirty="0" err="1">
+                <a:latin typeface="Lucida Console" panose="020B0609040504020204" pitchFamily="49" charset="0"/>
+              </a:rPr>
+              <a:t>sh</a:t>
+            </a:r>
+            <a:r>
+              <a:rPr lang="en-US" sz="1400" dirty="0">
+                <a:latin typeface="Lucida Console" panose="020B0609040504020204" pitchFamily="49" charset="0"/>
+              </a:rPr>
+              <a:t> -c 'echo deb http://pkg.jenkins.io/debian-stable binary/ &gt; /</a:t>
+            </a:r>
+            <a:r>
+              <a:rPr lang="en-US" sz="1400" dirty="0" err="1">
+                <a:latin typeface="Lucida Console" panose="020B0609040504020204" pitchFamily="49" charset="0"/>
+              </a:rPr>
+              <a:t>etc</a:t>
+            </a:r>
+            <a:r>
+              <a:rPr lang="en-US" sz="1400" dirty="0">
+                <a:latin typeface="Lucida Console" panose="020B0609040504020204" pitchFamily="49" charset="0"/>
+              </a:rPr>
+              <a:t>/apt/</a:t>
+            </a:r>
+            <a:r>
+              <a:rPr lang="en-US" sz="1400" dirty="0" err="1">
+                <a:latin typeface="Lucida Console" panose="020B0609040504020204" pitchFamily="49" charset="0"/>
+              </a:rPr>
+              <a:t>sources.list.d</a:t>
+            </a:r>
+            <a:r>
+              <a:rPr lang="en-US" sz="1400" dirty="0">
+                <a:latin typeface="Lucida Console" panose="020B0609040504020204" pitchFamily="49" charset="0"/>
+              </a:rPr>
+              <a:t>/</a:t>
+            </a:r>
+            <a:r>
+              <a:rPr lang="en-US" sz="1400" dirty="0" err="1">
+                <a:latin typeface="Lucida Console" panose="020B0609040504020204" pitchFamily="49" charset="0"/>
+              </a:rPr>
+              <a:t>jenkins.list</a:t>
+            </a:r>
+            <a:r>
+              <a:rPr lang="en-US" sz="1400" dirty="0">
+                <a:latin typeface="Lucida Console" panose="020B0609040504020204" pitchFamily="49" charset="0"/>
+              </a:rPr>
+              <a:t>'</a:t>
             </a:r>
             <a:endParaRPr lang="en-US" dirty="0"/>
           </a:p>
@@ -17663,33 +17792,15 @@
                                   </p:childTnLst>
                                 </p:cTn>
                               </p:par>
-                            </p:childTnLst>
-                          </p:cTn>
-                        </p:par>
-                      </p:childTnLst>
-                    </p:cTn>
-                  </p:par>
-                  <p:par>
-                    <p:cTn id="19" fill="hold">
-                      <p:stCondLst>
-                        <p:cond delay="indefinite"/>
-                      </p:stCondLst>
-                      <p:childTnLst>
-                        <p:par>
-                          <p:cTn id="20" fill="hold">
-                            <p:stCondLst>
-                              <p:cond delay="0"/>
-                            </p:stCondLst>
-                            <p:childTnLst>
                               <p:par>
-                                <p:cTn id="21" presetID="10" presetClass="entr" presetSubtype="0" fill="hold" grpId="0" nodeType="clickEffect">
+                                <p:cTn id="19" presetID="10" presetClass="entr" presetSubtype="0" fill="hold" grpId="0" nodeType="withEffect">
                                   <p:stCondLst>
                                     <p:cond delay="0"/>
                                   </p:stCondLst>
                                   <p:childTnLst>
                                     <p:set>
                                       <p:cBhvr>
-                                        <p:cTn id="22" dur="1" fill="hold">
+                                        <p:cTn id="20" dur="1" fill="hold">
                                           <p:stCondLst>
                                             <p:cond delay="0"/>
                                           </p:stCondLst>
@@ -17711,7 +17822,7 @@
                                     </p:set>
                                     <p:animEffect transition="in" filter="fade">
                                       <p:cBhvr>
-                                        <p:cTn id="23" dur="500"/>
+                                        <p:cTn id="21" dur="500"/>
                                         <p:tgtEl>
                                           <p:spTgt spid="11">
                                             <p:txEl>
@@ -17724,8 +17835,26 @@
                                   </p:childTnLst>
                                 </p:cTn>
                               </p:par>
+                            </p:childTnLst>
+                          </p:cTn>
+                        </p:par>
+                      </p:childTnLst>
+                    </p:cTn>
+                  </p:par>
+                  <p:par>
+                    <p:cTn id="22" fill="hold">
+                      <p:stCondLst>
+                        <p:cond delay="indefinite"/>
+                      </p:stCondLst>
+                      <p:childTnLst>
+                        <p:par>
+                          <p:cTn id="23" fill="hold">
+                            <p:stCondLst>
+                              <p:cond delay="0"/>
+                            </p:stCondLst>
+                            <p:childTnLst>
                               <p:par>
-                                <p:cTn id="24" presetID="10" presetClass="entr" presetSubtype="0" fill="hold" grpId="0" nodeType="withEffect">
+                                <p:cTn id="24" presetID="10" presetClass="entr" presetSubtype="0" fill="hold" grpId="0" nodeType="clickEffect">
                                   <p:stCondLst>
                                     <p:cond delay="0"/>
                                   </p:stCondLst>
@@ -17810,33 +17939,15 @@
                                   </p:childTnLst>
                                 </p:cTn>
                               </p:par>
-                            </p:childTnLst>
-                          </p:cTn>
-                        </p:par>
-                      </p:childTnLst>
-                    </p:cTn>
-                  </p:par>
-                  <p:par>
-                    <p:cTn id="30" fill="hold">
-                      <p:stCondLst>
-                        <p:cond delay="indefinite"/>
-                      </p:stCondLst>
-                      <p:childTnLst>
-                        <p:par>
-                          <p:cTn id="31" fill="hold">
-                            <p:stCondLst>
-                              <p:cond delay="0"/>
-                            </p:stCondLst>
-                            <p:childTnLst>
                               <p:par>
-                                <p:cTn id="32" presetID="10" presetClass="entr" presetSubtype="0" fill="hold" grpId="0" nodeType="clickEffect">
+                                <p:cTn id="30" presetID="10" presetClass="entr" presetSubtype="0" fill="hold" grpId="0" nodeType="withEffect">
                                   <p:stCondLst>
                                     <p:cond delay="0"/>
                                   </p:stCondLst>
                                   <p:childTnLst>
                                     <p:set>
                                       <p:cBhvr>
-                                        <p:cTn id="33" dur="1" fill="hold">
+                                        <p:cTn id="31" dur="1" fill="hold">
                                           <p:stCondLst>
                                             <p:cond delay="0"/>
                                           </p:stCondLst>
@@ -17858,7 +17969,7 @@
                                     </p:set>
                                     <p:animEffect transition="in" filter="fade">
                                       <p:cBhvr>
-                                        <p:cTn id="34" dur="500"/>
+                                        <p:cTn id="32" dur="500"/>
                                         <p:tgtEl>
                                           <p:spTgt spid="11">
                                             <p:txEl>
@@ -17871,8 +17982,26 @@
                                   </p:childTnLst>
                                 </p:cTn>
                               </p:par>
+                            </p:childTnLst>
+                          </p:cTn>
+                        </p:par>
+                      </p:childTnLst>
+                    </p:cTn>
+                  </p:par>
+                  <p:par>
+                    <p:cTn id="33" fill="hold">
+                      <p:stCondLst>
+                        <p:cond delay="indefinite"/>
+                      </p:stCondLst>
+                      <p:childTnLst>
+                        <p:par>
+                          <p:cTn id="34" fill="hold">
+                            <p:stCondLst>
+                              <p:cond delay="0"/>
+                            </p:stCondLst>
+                            <p:childTnLst>
                               <p:par>
-                                <p:cTn id="35" presetID="10" presetClass="entr" presetSubtype="0" fill="hold" grpId="0" nodeType="withEffect">
+                                <p:cTn id="35" presetID="10" presetClass="entr" presetSubtype="0" fill="hold" grpId="0" nodeType="clickEffect">
                                   <p:stCondLst>
                                     <p:cond delay="0"/>
                                   </p:stCondLst>
@@ -17906,6 +18035,49 @@
                                           <p:spTgt spid="11">
                                             <p:txEl>
                                               <p:pRg st="8" end="8"/>
+                                            </p:txEl>
+                                          </p:spTgt>
+                                        </p:tgtEl>
+                                      </p:cBhvr>
+                                    </p:animEffect>
+                                  </p:childTnLst>
+                                </p:cTn>
+                              </p:par>
+                              <p:par>
+                                <p:cTn id="38" presetID="10" presetClass="entr" presetSubtype="0" fill="hold" grpId="0" nodeType="withEffect">
+                                  <p:stCondLst>
+                                    <p:cond delay="0"/>
+                                  </p:stCondLst>
+                                  <p:childTnLst>
+                                    <p:set>
+                                      <p:cBhvr>
+                                        <p:cTn id="39" dur="1" fill="hold">
+                                          <p:stCondLst>
+                                            <p:cond delay="0"/>
+                                          </p:stCondLst>
+                                        </p:cTn>
+                                        <p:tgtEl>
+                                          <p:spTgt spid="11">
+                                            <p:txEl>
+                                              <p:pRg st="9" end="9"/>
+                                            </p:txEl>
+                                          </p:spTgt>
+                                        </p:tgtEl>
+                                        <p:attrNameLst>
+                                          <p:attrName>style.visibility</p:attrName>
+                                        </p:attrNameLst>
+                                      </p:cBhvr>
+                                      <p:to>
+                                        <p:strVal val="visible"/>
+                                      </p:to>
+                                    </p:set>
+                                    <p:animEffect transition="in" filter="fade">
+                                      <p:cBhvr>
+                                        <p:cTn id="40" dur="500"/>
+                                        <p:tgtEl>
+                                          <p:spTgt spid="11">
+                                            <p:txEl>
+                                              <p:pRg st="9" end="9"/>
                                             </p:txEl>
                                           </p:spTgt>
                                         </p:tgtEl>

</xml_diff>